<commit_message>
Primera parte del ejercicio 2 acerca de vectores
</commit_message>
<xml_diff>
--- a/Estructura de Datos Clase 1.pptx
+++ b/Estructura de Datos Clase 1.pptx
@@ -32,6 +32,7 @@
     <p:sldId id="280" r:id="rId26"/>
     <p:sldId id="281" r:id="rId27"/>
     <p:sldId id="282" r:id="rId28"/>
+    <p:sldId id="283" r:id="rId29"/>
   </p:sldIdLst>
   <p:sldSz cx="12192000" cy="6858000"/>
   <p:notesSz cx="6858000" cy="9144000"/>
@@ -326,7 +327,7 @@
           <a:p>
             <a:fld id="{96DFF08F-DC6B-4601-B491-B0F83F6DD2DA}" type="datetimeFigureOut">
               <a:rPr lang="en-US" smtClean="0"/>
-              <a:t>9/12/2018</a:t>
+              <a:t>9/17/2018</a:t>
             </a:fld>
             <a:endParaRPr lang="en-US" dirty="0"/>
           </a:p>
@@ -665,7 +666,7 @@
             <a:fld id="{96DFF08F-DC6B-4601-B491-B0F83F6DD2DA}" type="datetimeFigureOut">
               <a:rPr lang="en-US" smtClean="0"/>
               <a:pPr/>
-              <a:t>9/12/2018</a:t>
+              <a:t>9/17/2018</a:t>
             </a:fld>
             <a:endParaRPr lang="en-US" dirty="0"/>
           </a:p>
@@ -1068,7 +1069,7 @@
             <a:fld id="{96DFF08F-DC6B-4601-B491-B0F83F6DD2DA}" type="datetimeFigureOut">
               <a:rPr lang="en-US" smtClean="0"/>
               <a:pPr/>
-              <a:t>9/12/2018</a:t>
+              <a:t>9/17/2018</a:t>
             </a:fld>
             <a:endParaRPr lang="en-US" dirty="0"/>
           </a:p>
@@ -1406,7 +1407,7 @@
             <a:fld id="{96DFF08F-DC6B-4601-B491-B0F83F6DD2DA}" type="datetimeFigureOut">
               <a:rPr lang="en-US" smtClean="0"/>
               <a:pPr/>
-              <a:t>9/12/2018</a:t>
+              <a:t>9/17/2018</a:t>
             </a:fld>
             <a:endParaRPr lang="en-US" dirty="0"/>
           </a:p>
@@ -1728,7 +1729,7 @@
             <a:fld id="{96DFF08F-DC6B-4601-B491-B0F83F6DD2DA}" type="datetimeFigureOut">
               <a:rPr lang="en-US" smtClean="0"/>
               <a:pPr/>
-              <a:t>9/12/2018</a:t>
+              <a:t>9/17/2018</a:t>
             </a:fld>
             <a:endParaRPr lang="en-US" dirty="0"/>
           </a:p>
@@ -2126,7 +2127,7 @@
             <a:fld id="{96DFF08F-DC6B-4601-B491-B0F83F6DD2DA}" type="datetimeFigureOut">
               <a:rPr lang="en-US" smtClean="0"/>
               <a:pPr/>
-              <a:t>9/12/2018</a:t>
+              <a:t>9/17/2018</a:t>
             </a:fld>
             <a:endParaRPr lang="en-US" dirty="0"/>
           </a:p>
@@ -2384,7 +2385,7 @@
           <a:p>
             <a:fld id="{96DFF08F-DC6B-4601-B491-B0F83F6DD2DA}" type="datetimeFigureOut">
               <a:rPr lang="en-US" smtClean="0"/>
-              <a:t>9/12/2018</a:t>
+              <a:t>9/17/2018</a:t>
             </a:fld>
             <a:endParaRPr lang="en-US" dirty="0"/>
           </a:p>
@@ -2646,7 +2647,7 @@
           <a:p>
             <a:fld id="{96DFF08F-DC6B-4601-B491-B0F83F6DD2DA}" type="datetimeFigureOut">
               <a:rPr lang="en-US" smtClean="0"/>
-              <a:t>9/12/2018</a:t>
+              <a:t>9/17/2018</a:t>
             </a:fld>
             <a:endParaRPr lang="en-US" dirty="0"/>
           </a:p>
@@ -2908,7 +2909,7 @@
           <a:p>
             <a:fld id="{96DFF08F-DC6B-4601-B491-B0F83F6DD2DA}" type="datetimeFigureOut">
               <a:rPr lang="en-US" smtClean="0"/>
-              <a:t>9/12/2018</a:t>
+              <a:t>9/17/2018</a:t>
             </a:fld>
             <a:endParaRPr lang="en-US" dirty="0"/>
           </a:p>
@@ -3238,7 +3239,7 @@
             <a:fld id="{96DFF08F-DC6B-4601-B491-B0F83F6DD2DA}" type="datetimeFigureOut">
               <a:rPr lang="en-US" smtClean="0"/>
               <a:pPr/>
-              <a:t>9/12/2018</a:t>
+              <a:t>9/17/2018</a:t>
             </a:fld>
             <a:endParaRPr lang="en-US" dirty="0"/>
           </a:p>
@@ -3562,7 +3563,7 @@
           <a:p>
             <a:fld id="{96DFF08F-DC6B-4601-B491-B0F83F6DD2DA}" type="datetimeFigureOut">
               <a:rPr lang="en-US" smtClean="0"/>
-              <a:t>9/12/2018</a:t>
+              <a:t>9/17/2018</a:t>
             </a:fld>
             <a:endParaRPr lang="en-US" dirty="0"/>
           </a:p>
@@ -4019,7 +4020,7 @@
           <a:p>
             <a:fld id="{96DFF08F-DC6B-4601-B491-B0F83F6DD2DA}" type="datetimeFigureOut">
               <a:rPr lang="en-US" smtClean="0"/>
-              <a:t>9/12/2018</a:t>
+              <a:t>9/17/2018</a:t>
             </a:fld>
             <a:endParaRPr lang="en-US" dirty="0"/>
           </a:p>
@@ -4224,7 +4225,7 @@
           <a:p>
             <a:fld id="{96DFF08F-DC6B-4601-B491-B0F83F6DD2DA}" type="datetimeFigureOut">
               <a:rPr lang="en-US" smtClean="0"/>
-              <a:t>9/12/2018</a:t>
+              <a:t>9/17/2018</a:t>
             </a:fld>
             <a:endParaRPr lang="en-US" dirty="0"/>
           </a:p>
@@ -4401,7 +4402,7 @@
           <a:p>
             <a:fld id="{96DFF08F-DC6B-4601-B491-B0F83F6DD2DA}" type="datetimeFigureOut">
               <a:rPr lang="en-US" smtClean="0"/>
-              <a:t>9/12/2018</a:t>
+              <a:t>9/17/2018</a:t>
             </a:fld>
             <a:endParaRPr lang="en-US" dirty="0"/>
           </a:p>
@@ -4734,7 +4735,7 @@
           <a:p>
             <a:fld id="{96DFF08F-DC6B-4601-B491-B0F83F6DD2DA}" type="datetimeFigureOut">
               <a:rPr lang="en-US" smtClean="0"/>
-              <a:t>9/12/2018</a:t>
+              <a:t>9/17/2018</a:t>
             </a:fld>
             <a:endParaRPr lang="en-US" dirty="0"/>
           </a:p>
@@ -5079,7 +5080,7 @@
           <a:p>
             <a:fld id="{96DFF08F-DC6B-4601-B491-B0F83F6DD2DA}" type="datetimeFigureOut">
               <a:rPr lang="en-US" smtClean="0"/>
-              <a:t>9/12/2018</a:t>
+              <a:t>9/17/2018</a:t>
             </a:fld>
             <a:endParaRPr lang="en-US" dirty="0"/>
           </a:p>
@@ -7197,7 +7198,7 @@
             <a:fld id="{96DFF08F-DC6B-4601-B491-B0F83F6DD2DA}" type="datetimeFigureOut">
               <a:rPr lang="en-US" smtClean="0"/>
               <a:pPr/>
-              <a:t>9/12/2018</a:t>
+              <a:t>9/17/2018</a:t>
             </a:fld>
             <a:endParaRPr lang="en-US" dirty="0"/>
           </a:p>
@@ -17022,7 +17023,10 @@
           <a:bodyPr/>
           <a:lstStyle/>
           <a:p>
-            <a:endParaRPr lang="es-MX"/>
+            <a:r>
+              <a:rPr lang="es-MX" dirty="0"/>
+              <a:t>Análisis de Algoritmos</a:t>
+            </a:r>
           </a:p>
         </p:txBody>
       </p:sp>
@@ -17047,7 +17051,36 @@
           <a:bodyPr/>
           <a:lstStyle/>
           <a:p>
-            <a:endParaRPr lang="es-MX"/>
+            <a:r>
+              <a:rPr lang="es-MX" dirty="0"/>
+              <a:t>Algoritmos</a:t>
+            </a:r>
+          </a:p>
+          <a:p>
+            <a:r>
+              <a:rPr lang="es-MX" dirty="0"/>
+              <a:t>Una manera de estudiar la eficiencia de un algoritmo es implementarlo y experimentarlo mientras corre el programa en varias entrada de pruebas guardando el tiempo  que ocurre durante cada ejecución.</a:t>
+            </a:r>
+          </a:p>
+          <a:p>
+            <a:r>
+              <a:rPr lang="es-MX" dirty="0"/>
+              <a:t>Los métodos  reportan a la consola en milisegundos para ver el tiempo que pasa desde un </a:t>
+            </a:r>
+            <a:r>
+              <a:rPr lang="es-MX" dirty="0" err="1"/>
+              <a:t>benchmark</a:t>
+            </a:r>
+            <a:r>
+              <a:rPr lang="es-MX" dirty="0"/>
+              <a:t>.</a:t>
+            </a:r>
+          </a:p>
+          <a:p>
+            <a:pPr marL="0" indent="0">
+              <a:buNone/>
+            </a:pPr>
+            <a:endParaRPr lang="es-MX" dirty="0"/>
           </a:p>
         </p:txBody>
       </p:sp>
@@ -17102,7 +17135,10 @@
           <a:bodyPr/>
           <a:lstStyle/>
           <a:p>
-            <a:endParaRPr lang="es-MX"/>
+            <a:r>
+              <a:rPr lang="es-MX" dirty="0"/>
+              <a:t>Análisis de algoritmo</a:t>
+            </a:r>
           </a:p>
         </p:txBody>
       </p:sp>
@@ -17127,7 +17163,28 @@
           <a:bodyPr/>
           <a:lstStyle/>
           <a:p>
-            <a:endParaRPr lang="es-MX"/>
+            <a:r>
+              <a:rPr lang="es-MX" dirty="0"/>
+              <a:t>La complejidad de un algoritmo (complejidad computacional), estudia los recursos y esfuerzos requeridos durante el cálculo para resolver un problema los cuales se dividen en : Tiempo de ejecución. Y espacio en memoria.</a:t>
+            </a:r>
+          </a:p>
+          <a:p>
+            <a:r>
+              <a:rPr lang="es-MX" dirty="0"/>
+              <a:t>Factor Tiempo. Es mas importante que el factor espacio, pero existen algoritmos que ofrecen el peor de los casos en un menor tiempo que el mejor de los casos, lo cual no es la mejor de las soluciones.</a:t>
+            </a:r>
+          </a:p>
+          <a:p>
+            <a:r>
+              <a:rPr lang="es-MX" dirty="0"/>
+              <a:t>El factor tiempo de ejecución de un algoritmo depende de la cantidad de datos que se requieren procesar.</a:t>
+            </a:r>
+          </a:p>
+          <a:p>
+            <a:pPr marL="0" indent="0">
+              <a:buNone/>
+            </a:pPr>
+            <a:endParaRPr lang="es-MX" dirty="0"/>
           </a:p>
         </p:txBody>
       </p:sp>
@@ -17135,6 +17192,110 @@
     <p:extLst>
       <p:ext uri="{BB962C8B-B14F-4D97-AF65-F5344CB8AC3E}">
         <p14:creationId xmlns:p14="http://schemas.microsoft.com/office/powerpoint/2010/main" val="73385958"/>
+      </p:ext>
+    </p:extLst>
+  </p:cSld>
+  <p:clrMapOvr>
+    <a:masterClrMapping/>
+  </p:clrMapOvr>
+</p:sld>
+</file>
+
+<file path=ppt/slides/slide28.xml><?xml version="1.0" encoding="utf-8"?>
+<p:sld xmlns:a="http://schemas.openxmlformats.org/drawingml/2006/main" xmlns:r="http://schemas.openxmlformats.org/officeDocument/2006/relationships" xmlns:p="http://schemas.openxmlformats.org/presentationml/2006/main">
+  <p:cSld>
+    <p:spTree>
+      <p:nvGrpSpPr>
+        <p:cNvPr id="1" name=""/>
+        <p:cNvGrpSpPr/>
+        <p:nvPr/>
+      </p:nvGrpSpPr>
+      <p:grpSpPr>
+        <a:xfrm>
+          <a:off x="0" y="0"/>
+          <a:ext cx="0" cy="0"/>
+          <a:chOff x="0" y="0"/>
+          <a:chExt cx="0" cy="0"/>
+        </a:xfrm>
+      </p:grpSpPr>
+      <p:sp>
+        <p:nvSpPr>
+          <p:cNvPr id="2" name="Título 1">
+            <a:extLst>
+              <a:ext uri="{FF2B5EF4-FFF2-40B4-BE49-F238E27FC236}">
+                <a16:creationId xmlns:a16="http://schemas.microsoft.com/office/drawing/2014/main" id="{89D1A01C-BA1B-4040-8BBA-C9E21BF84B84}"/>
+              </a:ext>
+            </a:extLst>
+          </p:cNvPr>
+          <p:cNvSpPr>
+            <a:spLocks noGrp="1"/>
+          </p:cNvSpPr>
+          <p:nvPr>
+            <p:ph type="title"/>
+          </p:nvPr>
+        </p:nvSpPr>
+        <p:spPr/>
+        <p:txBody>
+          <a:bodyPr/>
+          <a:lstStyle/>
+          <a:p>
+            <a:r>
+              <a:rPr lang="es-MX" dirty="0"/>
+              <a:t>Análisis de algoritmos</a:t>
+            </a:r>
+          </a:p>
+        </p:txBody>
+      </p:sp>
+      <p:sp>
+        <p:nvSpPr>
+          <p:cNvPr id="3" name="Marcador de contenido 2">
+            <a:extLst>
+              <a:ext uri="{FF2B5EF4-FFF2-40B4-BE49-F238E27FC236}">
+                <a16:creationId xmlns:a16="http://schemas.microsoft.com/office/drawing/2014/main" id="{8373C38C-6445-4832-A8EB-E8E21192BF3A}"/>
+              </a:ext>
+            </a:extLst>
+          </p:cNvPr>
+          <p:cNvSpPr>
+            <a:spLocks noGrp="1"/>
+          </p:cNvSpPr>
+          <p:nvPr>
+            <p:ph idx="1"/>
+          </p:nvPr>
+        </p:nvSpPr>
+        <p:spPr/>
+        <p:txBody>
+          <a:bodyPr/>
+          <a:lstStyle/>
+          <a:p>
+            <a:r>
+              <a:rPr lang="es-MX" dirty="0"/>
+              <a:t>EN computación al momento de realizar un programa se debe obtener su algoritmo</a:t>
+            </a:r>
+          </a:p>
+          <a:p>
+            <a:r>
+              <a:rPr lang="es-MX" dirty="0"/>
+              <a:t>Cada programador puede tener un método diferente de resolver un problema. </a:t>
+            </a:r>
+          </a:p>
+          <a:p>
+            <a:r>
+              <a:rPr lang="es-MX" dirty="0"/>
+              <a:t>Análisis de algoritmo el objetivo de este es la búsqueda de algoritmos eficientes.</a:t>
+            </a:r>
+          </a:p>
+          <a:p>
+            <a:r>
+              <a:rPr lang="es-MX" dirty="0"/>
+              <a:t>Complejidad de algoritmos</a:t>
+            </a:r>
+          </a:p>
+        </p:txBody>
+      </p:sp>
+    </p:spTree>
+    <p:extLst>
+      <p:ext uri="{BB962C8B-B14F-4D97-AF65-F5344CB8AC3E}">
+        <p14:creationId xmlns:p14="http://schemas.microsoft.com/office/powerpoint/2010/main" val="1851767822"/>
       </p:ext>
     </p:extLst>
   </p:cSld>

</xml_diff>

<commit_message>
Presentacion unidad 1 completa
</commit_message>
<xml_diff>
--- a/Estructura de Datos Clase 1.pptx
+++ b/Estructura de Datos Clase 1.pptx
@@ -33,6 +33,12 @@
     <p:sldId id="281" r:id="rId27"/>
     <p:sldId id="282" r:id="rId28"/>
     <p:sldId id="283" r:id="rId29"/>
+    <p:sldId id="284" r:id="rId30"/>
+    <p:sldId id="285" r:id="rId31"/>
+    <p:sldId id="286" r:id="rId32"/>
+    <p:sldId id="287" r:id="rId33"/>
+    <p:sldId id="288" r:id="rId34"/>
+    <p:sldId id="289" r:id="rId35"/>
   </p:sldIdLst>
   <p:sldSz cx="12192000" cy="6858000"/>
   <p:notesSz cx="6858000" cy="9144000"/>
@@ -327,7 +333,7 @@
           <a:p>
             <a:fld id="{96DFF08F-DC6B-4601-B491-B0F83F6DD2DA}" type="datetimeFigureOut">
               <a:rPr lang="en-US" smtClean="0"/>
-              <a:t>9/17/2018</a:t>
+              <a:t>9/19/2018</a:t>
             </a:fld>
             <a:endParaRPr lang="en-US" dirty="0"/>
           </a:p>
@@ -666,7 +672,7 @@
             <a:fld id="{96DFF08F-DC6B-4601-B491-B0F83F6DD2DA}" type="datetimeFigureOut">
               <a:rPr lang="en-US" smtClean="0"/>
               <a:pPr/>
-              <a:t>9/17/2018</a:t>
+              <a:t>9/19/2018</a:t>
             </a:fld>
             <a:endParaRPr lang="en-US" dirty="0"/>
           </a:p>
@@ -1069,7 +1075,7 @@
             <a:fld id="{96DFF08F-DC6B-4601-B491-B0F83F6DD2DA}" type="datetimeFigureOut">
               <a:rPr lang="en-US" smtClean="0"/>
               <a:pPr/>
-              <a:t>9/17/2018</a:t>
+              <a:t>9/19/2018</a:t>
             </a:fld>
             <a:endParaRPr lang="en-US" dirty="0"/>
           </a:p>
@@ -1407,7 +1413,7 @@
             <a:fld id="{96DFF08F-DC6B-4601-B491-B0F83F6DD2DA}" type="datetimeFigureOut">
               <a:rPr lang="en-US" smtClean="0"/>
               <a:pPr/>
-              <a:t>9/17/2018</a:t>
+              <a:t>9/19/2018</a:t>
             </a:fld>
             <a:endParaRPr lang="en-US" dirty="0"/>
           </a:p>
@@ -1729,7 +1735,7 @@
             <a:fld id="{96DFF08F-DC6B-4601-B491-B0F83F6DD2DA}" type="datetimeFigureOut">
               <a:rPr lang="en-US" smtClean="0"/>
               <a:pPr/>
-              <a:t>9/17/2018</a:t>
+              <a:t>9/19/2018</a:t>
             </a:fld>
             <a:endParaRPr lang="en-US" dirty="0"/>
           </a:p>
@@ -2127,7 +2133,7 @@
             <a:fld id="{96DFF08F-DC6B-4601-B491-B0F83F6DD2DA}" type="datetimeFigureOut">
               <a:rPr lang="en-US" smtClean="0"/>
               <a:pPr/>
-              <a:t>9/17/2018</a:t>
+              <a:t>9/19/2018</a:t>
             </a:fld>
             <a:endParaRPr lang="en-US" dirty="0"/>
           </a:p>
@@ -2385,7 +2391,7 @@
           <a:p>
             <a:fld id="{96DFF08F-DC6B-4601-B491-B0F83F6DD2DA}" type="datetimeFigureOut">
               <a:rPr lang="en-US" smtClean="0"/>
-              <a:t>9/17/2018</a:t>
+              <a:t>9/19/2018</a:t>
             </a:fld>
             <a:endParaRPr lang="en-US" dirty="0"/>
           </a:p>
@@ -2647,7 +2653,7 @@
           <a:p>
             <a:fld id="{96DFF08F-DC6B-4601-B491-B0F83F6DD2DA}" type="datetimeFigureOut">
               <a:rPr lang="en-US" smtClean="0"/>
-              <a:t>9/17/2018</a:t>
+              <a:t>9/19/2018</a:t>
             </a:fld>
             <a:endParaRPr lang="en-US" dirty="0"/>
           </a:p>
@@ -2909,7 +2915,7 @@
           <a:p>
             <a:fld id="{96DFF08F-DC6B-4601-B491-B0F83F6DD2DA}" type="datetimeFigureOut">
               <a:rPr lang="en-US" smtClean="0"/>
-              <a:t>9/17/2018</a:t>
+              <a:t>9/19/2018</a:t>
             </a:fld>
             <a:endParaRPr lang="en-US" dirty="0"/>
           </a:p>
@@ -3239,7 +3245,7 @@
             <a:fld id="{96DFF08F-DC6B-4601-B491-B0F83F6DD2DA}" type="datetimeFigureOut">
               <a:rPr lang="en-US" smtClean="0"/>
               <a:pPr/>
-              <a:t>9/17/2018</a:t>
+              <a:t>9/19/2018</a:t>
             </a:fld>
             <a:endParaRPr lang="en-US" dirty="0"/>
           </a:p>
@@ -3563,7 +3569,7 @@
           <a:p>
             <a:fld id="{96DFF08F-DC6B-4601-B491-B0F83F6DD2DA}" type="datetimeFigureOut">
               <a:rPr lang="en-US" smtClean="0"/>
-              <a:t>9/17/2018</a:t>
+              <a:t>9/19/2018</a:t>
             </a:fld>
             <a:endParaRPr lang="en-US" dirty="0"/>
           </a:p>
@@ -4020,7 +4026,7 @@
           <a:p>
             <a:fld id="{96DFF08F-DC6B-4601-B491-B0F83F6DD2DA}" type="datetimeFigureOut">
               <a:rPr lang="en-US" smtClean="0"/>
-              <a:t>9/17/2018</a:t>
+              <a:t>9/19/2018</a:t>
             </a:fld>
             <a:endParaRPr lang="en-US" dirty="0"/>
           </a:p>
@@ -4225,7 +4231,7 @@
           <a:p>
             <a:fld id="{96DFF08F-DC6B-4601-B491-B0F83F6DD2DA}" type="datetimeFigureOut">
               <a:rPr lang="en-US" smtClean="0"/>
-              <a:t>9/17/2018</a:t>
+              <a:t>9/19/2018</a:t>
             </a:fld>
             <a:endParaRPr lang="en-US" dirty="0"/>
           </a:p>
@@ -4402,7 +4408,7 @@
           <a:p>
             <a:fld id="{96DFF08F-DC6B-4601-B491-B0F83F6DD2DA}" type="datetimeFigureOut">
               <a:rPr lang="en-US" smtClean="0"/>
-              <a:t>9/17/2018</a:t>
+              <a:t>9/19/2018</a:t>
             </a:fld>
             <a:endParaRPr lang="en-US" dirty="0"/>
           </a:p>
@@ -4735,7 +4741,7 @@
           <a:p>
             <a:fld id="{96DFF08F-DC6B-4601-B491-B0F83F6DD2DA}" type="datetimeFigureOut">
               <a:rPr lang="en-US" smtClean="0"/>
-              <a:t>9/17/2018</a:t>
+              <a:t>9/19/2018</a:t>
             </a:fld>
             <a:endParaRPr lang="en-US" dirty="0"/>
           </a:p>
@@ -5080,7 +5086,7 @@
           <a:p>
             <a:fld id="{96DFF08F-DC6B-4601-B491-B0F83F6DD2DA}" type="datetimeFigureOut">
               <a:rPr lang="en-US" smtClean="0"/>
-              <a:t>9/17/2018</a:t>
+              <a:t>9/19/2018</a:t>
             </a:fld>
             <a:endParaRPr lang="en-US" dirty="0"/>
           </a:p>
@@ -7198,7 +7204,7 @@
             <a:fld id="{96DFF08F-DC6B-4601-B491-B0F83F6DD2DA}" type="datetimeFigureOut">
               <a:rPr lang="en-US" smtClean="0"/>
               <a:pPr/>
-              <a:t>9/17/2018</a:t>
+              <a:t>9/19/2018</a:t>
             </a:fld>
             <a:endParaRPr lang="en-US" dirty="0"/>
           </a:p>
@@ -17305,6 +17311,182 @@
 </p:sld>
 </file>
 
+<file path=ppt/slides/slide29.xml><?xml version="1.0" encoding="utf-8"?>
+<p:sld xmlns:a="http://schemas.openxmlformats.org/drawingml/2006/main" xmlns:r="http://schemas.openxmlformats.org/officeDocument/2006/relationships" xmlns:p="http://schemas.openxmlformats.org/presentationml/2006/main">
+  <p:cSld>
+    <p:spTree>
+      <p:nvGrpSpPr>
+        <p:cNvPr id="1" name=""/>
+        <p:cNvGrpSpPr/>
+        <p:nvPr/>
+      </p:nvGrpSpPr>
+      <p:grpSpPr>
+        <a:xfrm>
+          <a:off x="0" y="0"/>
+          <a:ext cx="0" cy="0"/>
+          <a:chOff x="0" y="0"/>
+          <a:chExt cx="0" cy="0"/>
+        </a:xfrm>
+      </p:grpSpPr>
+      <p:sp>
+        <p:nvSpPr>
+          <p:cNvPr id="2" name="Título 1">
+            <a:extLst>
+              <a:ext uri="{FF2B5EF4-FFF2-40B4-BE49-F238E27FC236}">
+                <a16:creationId xmlns:a16="http://schemas.microsoft.com/office/drawing/2014/main" id="{C3FB055D-8A17-459F-AF33-E9E1AE9EFF7B}"/>
+              </a:ext>
+            </a:extLst>
+          </p:cNvPr>
+          <p:cNvSpPr>
+            <a:spLocks noGrp="1"/>
+          </p:cNvSpPr>
+          <p:nvPr>
+            <p:ph type="title"/>
+          </p:nvPr>
+        </p:nvSpPr>
+        <p:spPr/>
+        <p:txBody>
+          <a:bodyPr/>
+          <a:lstStyle/>
+          <a:p>
+            <a:r>
+              <a:rPr lang="es-MX" dirty="0"/>
+              <a:t>Complejidad en el tiempo</a:t>
+            </a:r>
+          </a:p>
+        </p:txBody>
+      </p:sp>
+      <p:sp>
+        <p:nvSpPr>
+          <p:cNvPr id="3" name="Marcador de contenido 2">
+            <a:extLst>
+              <a:ext uri="{FF2B5EF4-FFF2-40B4-BE49-F238E27FC236}">
+                <a16:creationId xmlns:a16="http://schemas.microsoft.com/office/drawing/2014/main" id="{1FEA2BA7-AC1A-4298-B9B6-DDAF8461D173}"/>
+              </a:ext>
+            </a:extLst>
+          </p:cNvPr>
+          <p:cNvSpPr>
+            <a:spLocks noGrp="1"/>
+          </p:cNvSpPr>
+          <p:nvPr>
+            <p:ph idx="1"/>
+          </p:nvPr>
+        </p:nvSpPr>
+        <p:spPr/>
+        <p:txBody>
+          <a:bodyPr/>
+          <a:lstStyle/>
+          <a:p>
+            <a:r>
+              <a:rPr lang="es-MX" dirty="0"/>
+              <a:t>Definiciones:</a:t>
+            </a:r>
+            <a:br>
+              <a:rPr lang="es-MX" dirty="0"/>
+            </a:br>
+            <a:r>
+              <a:rPr lang="es-MX" dirty="0"/>
+              <a:t>• T(n) Tiempo de ejecución del algoritmo.</a:t>
+            </a:r>
+            <a:br>
+              <a:rPr lang="es-MX" dirty="0"/>
+            </a:br>
+            <a:r>
+              <a:rPr lang="es-MX" dirty="0"/>
+              <a:t>• F(n) Tiempo al introducir los datos al algoritmo </a:t>
+            </a:r>
+            <a:br>
+              <a:rPr lang="es-MX" dirty="0"/>
+            </a:br>
+            <a:endParaRPr lang="es-MX" dirty="0"/>
+          </a:p>
+          <a:p>
+            <a:r>
+              <a:rPr lang="es-MX" b="1" dirty="0"/>
+              <a:t>El </a:t>
+            </a:r>
+            <a:r>
+              <a:rPr lang="es-MX" b="1" i="1" dirty="0"/>
+              <a:t>tiempo de ejecución de un algoritmo</a:t>
+            </a:r>
+            <a:r>
+              <a:rPr lang="es-MX" dirty="0"/>
+              <a:t>: se refiere a la suma de los</a:t>
+            </a:r>
+            <a:br>
+              <a:rPr lang="es-MX" dirty="0"/>
+            </a:br>
+            <a:r>
+              <a:rPr lang="es-MX" dirty="0"/>
+              <a:t>tiempos en los que el programa tarda en ejecutar una a una todas sus</a:t>
+            </a:r>
+            <a:br>
+              <a:rPr lang="es-MX" dirty="0"/>
+            </a:br>
+            <a:r>
+              <a:rPr lang="es-MX" dirty="0"/>
+              <a:t>instrucciones. </a:t>
+            </a:r>
+            <a:br>
+              <a:rPr lang="es-MX" dirty="0"/>
+            </a:br>
+            <a:endParaRPr lang="es-MX" dirty="0"/>
+          </a:p>
+          <a:p>
+            <a:r>
+              <a:rPr lang="es-MX" dirty="0"/>
+              <a:t>Tomando en cuanta que cada instrucción requiere una unidad de tiempo,</a:t>
+            </a:r>
+            <a:br>
+              <a:rPr lang="es-MX" dirty="0"/>
+            </a:br>
+            <a:r>
+              <a:rPr lang="es-MX" dirty="0"/>
+              <a:t>dicho tiempo se puede calcular en función de </a:t>
+            </a:r>
+            <a:r>
+              <a:rPr lang="es-MX" b="1" dirty="0"/>
+              <a:t>n </a:t>
+            </a:r>
+            <a:r>
+              <a:rPr lang="es-MX" dirty="0"/>
+              <a:t>(el número de datos), lo</a:t>
+            </a:r>
+            <a:br>
+              <a:rPr lang="es-MX" dirty="0"/>
+            </a:br>
+            <a:r>
+              <a:rPr lang="es-MX" dirty="0"/>
+              <a:t>que se denomina </a:t>
+            </a:r>
+            <a:r>
+              <a:rPr lang="es-MX" b="1" dirty="0"/>
+              <a:t>T(n)</a:t>
+            </a:r>
+            <a:r>
+              <a:rPr lang="es-MX" dirty="0"/>
+              <a:t> </a:t>
+            </a:r>
+            <a:br>
+              <a:rPr lang="es-MX" dirty="0"/>
+            </a:br>
+            <a:endParaRPr lang="es-MX" dirty="0"/>
+          </a:p>
+        </p:txBody>
+      </p:sp>
+    </p:spTree>
+    <p:extLst>
+      <p:ext uri="{BB962C8B-B14F-4D97-AF65-F5344CB8AC3E}">
+        <p14:creationId xmlns:p14="http://schemas.microsoft.com/office/powerpoint/2010/main" val="2735311119"/>
+      </p:ext>
+    </p:extLst>
+  </p:cSld>
+  <p:clrMapOvr>
+    <a:masterClrMapping/>
+  </p:clrMapOvr>
+</p:sld>
+</file>
+
 <file path=ppt/slides/slide3.xml><?xml version="1.0" encoding="utf-8"?>
 <p:sld xmlns:a="http://schemas.openxmlformats.org/drawingml/2006/main" xmlns:r="http://schemas.openxmlformats.org/officeDocument/2006/relationships" xmlns:p="http://schemas.openxmlformats.org/presentationml/2006/main">
   <p:cSld>
@@ -17412,6 +17594,600 @@
     <p:extLst>
       <p:ext uri="{BB962C8B-B14F-4D97-AF65-F5344CB8AC3E}">
         <p14:creationId xmlns:p14="http://schemas.microsoft.com/office/powerpoint/2010/main" val="1231604987"/>
+      </p:ext>
+    </p:extLst>
+  </p:cSld>
+  <p:clrMapOvr>
+    <a:masterClrMapping/>
+  </p:clrMapOvr>
+</p:sld>
+</file>
+
+<file path=ppt/slides/slide30.xml><?xml version="1.0" encoding="utf-8"?>
+<p:sld xmlns:a="http://schemas.openxmlformats.org/drawingml/2006/main" xmlns:r="http://schemas.openxmlformats.org/officeDocument/2006/relationships" xmlns:p="http://schemas.openxmlformats.org/presentationml/2006/main">
+  <p:cSld>
+    <p:spTree>
+      <p:nvGrpSpPr>
+        <p:cNvPr id="1" name=""/>
+        <p:cNvGrpSpPr/>
+        <p:nvPr/>
+      </p:nvGrpSpPr>
+      <p:grpSpPr>
+        <a:xfrm>
+          <a:off x="0" y="0"/>
+          <a:ext cx="0" cy="0"/>
+          <a:chOff x="0" y="0"/>
+          <a:chExt cx="0" cy="0"/>
+        </a:xfrm>
+      </p:grpSpPr>
+      <p:sp>
+        <p:nvSpPr>
+          <p:cNvPr id="2" name="Título 1">
+            <a:extLst>
+              <a:ext uri="{FF2B5EF4-FFF2-40B4-BE49-F238E27FC236}">
+                <a16:creationId xmlns:a16="http://schemas.microsoft.com/office/drawing/2014/main" id="{889E9843-ED3C-4DA5-9971-DD3C71DA0945}"/>
+              </a:ext>
+            </a:extLst>
+          </p:cNvPr>
+          <p:cNvSpPr>
+            <a:spLocks noGrp="1"/>
+          </p:cNvSpPr>
+          <p:nvPr>
+            <p:ph type="title"/>
+          </p:nvPr>
+        </p:nvSpPr>
+        <p:spPr/>
+        <p:txBody>
+          <a:bodyPr/>
+          <a:lstStyle/>
+          <a:p>
+            <a:r>
+              <a:rPr lang="es-MX" dirty="0"/>
+              <a:t>Eficiencia de los algoritmos</a:t>
+            </a:r>
+          </a:p>
+        </p:txBody>
+      </p:sp>
+      <p:sp>
+        <p:nvSpPr>
+          <p:cNvPr id="3" name="Marcador de contenido 2">
+            <a:extLst>
+              <a:ext uri="{FF2B5EF4-FFF2-40B4-BE49-F238E27FC236}">
+                <a16:creationId xmlns:a16="http://schemas.microsoft.com/office/drawing/2014/main" id="{A7826DFB-648D-49C8-84EE-6FDF6C0D55E1}"/>
+              </a:ext>
+            </a:extLst>
+          </p:cNvPr>
+          <p:cNvSpPr>
+            <a:spLocks noGrp="1"/>
+          </p:cNvSpPr>
+          <p:nvPr>
+            <p:ph idx="1"/>
+          </p:nvPr>
+        </p:nvSpPr>
+        <p:spPr/>
+        <p:txBody>
+          <a:bodyPr/>
+          <a:lstStyle/>
+          <a:p>
+            <a:r>
+              <a:rPr lang="es-MX" dirty="0"/>
+              <a:t>Para que un algoritmo sea eficiente debemos tener en cuenta el</a:t>
+            </a:r>
+            <a:br>
+              <a:rPr lang="es-MX" dirty="0"/>
+            </a:br>
+            <a:r>
+              <a:rPr lang="es-MX" dirty="0"/>
+              <a:t>tiempo de ejecución, y la cantidad de memoria que va a requerir para</a:t>
+            </a:r>
+            <a:br>
+              <a:rPr lang="es-MX" dirty="0"/>
+            </a:br>
+            <a:r>
+              <a:rPr lang="es-MX" dirty="0"/>
+              <a:t>funcionar. </a:t>
+            </a:r>
+            <a:br>
+              <a:rPr lang="es-MX" dirty="0"/>
+            </a:br>
+            <a:endParaRPr lang="es-MX" dirty="0"/>
+          </a:p>
+          <a:p>
+            <a:r>
+              <a:rPr lang="es-MX" dirty="0"/>
+              <a:t>Aun que el problema se pueda resolver de varias maneras debemos</a:t>
+            </a:r>
+            <a:br>
+              <a:rPr lang="es-MX" dirty="0"/>
+            </a:br>
+            <a:r>
+              <a:rPr lang="es-MX" dirty="0"/>
+              <a:t>optar por implementar la solución más eficiente, es decir la que se</a:t>
+            </a:r>
+            <a:br>
+              <a:rPr lang="es-MX" dirty="0"/>
+            </a:br>
+            <a:r>
+              <a:rPr lang="es-MX" dirty="0"/>
+              <a:t>realice en el menor tiempo y con la menor cantidad de memoria. </a:t>
+            </a:r>
+            <a:br>
+              <a:rPr lang="es-MX" dirty="0"/>
+            </a:br>
+            <a:endParaRPr lang="es-MX" dirty="0"/>
+          </a:p>
+        </p:txBody>
+      </p:sp>
+    </p:spTree>
+    <p:extLst>
+      <p:ext uri="{BB962C8B-B14F-4D97-AF65-F5344CB8AC3E}">
+        <p14:creationId xmlns:p14="http://schemas.microsoft.com/office/powerpoint/2010/main" val="95048571"/>
+      </p:ext>
+    </p:extLst>
+  </p:cSld>
+  <p:clrMapOvr>
+    <a:masterClrMapping/>
+  </p:clrMapOvr>
+</p:sld>
+</file>
+
+<file path=ppt/slides/slide31.xml><?xml version="1.0" encoding="utf-8"?>
+<p:sld xmlns:a="http://schemas.openxmlformats.org/drawingml/2006/main" xmlns:r="http://schemas.openxmlformats.org/officeDocument/2006/relationships" xmlns:p="http://schemas.openxmlformats.org/presentationml/2006/main">
+  <p:cSld>
+    <p:spTree>
+      <p:nvGrpSpPr>
+        <p:cNvPr id="1" name=""/>
+        <p:cNvGrpSpPr/>
+        <p:nvPr/>
+      </p:nvGrpSpPr>
+      <p:grpSpPr>
+        <a:xfrm>
+          <a:off x="0" y="0"/>
+          <a:ext cx="0" cy="0"/>
+          <a:chOff x="0" y="0"/>
+          <a:chExt cx="0" cy="0"/>
+        </a:xfrm>
+      </p:grpSpPr>
+      <p:sp>
+        <p:nvSpPr>
+          <p:cNvPr id="2" name="Título 1">
+            <a:extLst>
+              <a:ext uri="{FF2B5EF4-FFF2-40B4-BE49-F238E27FC236}">
+                <a16:creationId xmlns:a16="http://schemas.microsoft.com/office/drawing/2014/main" id="{1361B91B-8D96-4180-9731-568578B4F8DE}"/>
+              </a:ext>
+            </a:extLst>
+          </p:cNvPr>
+          <p:cNvSpPr>
+            <a:spLocks noGrp="1"/>
+          </p:cNvSpPr>
+          <p:nvPr>
+            <p:ph type="title"/>
+          </p:nvPr>
+        </p:nvSpPr>
+        <p:spPr/>
+        <p:txBody>
+          <a:bodyPr/>
+          <a:lstStyle/>
+          <a:p>
+            <a:r>
+              <a:rPr lang="es-MX" dirty="0"/>
+              <a:t>Complejidad en el espacio</a:t>
+            </a:r>
+          </a:p>
+        </p:txBody>
+      </p:sp>
+      <p:sp>
+        <p:nvSpPr>
+          <p:cNvPr id="3" name="Marcador de contenido 2">
+            <a:extLst>
+              <a:ext uri="{FF2B5EF4-FFF2-40B4-BE49-F238E27FC236}">
+                <a16:creationId xmlns:a16="http://schemas.microsoft.com/office/drawing/2014/main" id="{2EE1C027-816F-4C83-9C54-716A56B3E5AC}"/>
+              </a:ext>
+            </a:extLst>
+          </p:cNvPr>
+          <p:cNvSpPr>
+            <a:spLocks noGrp="1"/>
+          </p:cNvSpPr>
+          <p:nvPr>
+            <p:ph idx="1"/>
+          </p:nvPr>
+        </p:nvSpPr>
+        <p:spPr/>
+        <p:txBody>
+          <a:bodyPr/>
+          <a:lstStyle/>
+          <a:p>
+            <a:r>
+              <a:rPr lang="es-MX" dirty="0"/>
+              <a:t>Se refiere a la memoria que utiliza un programa para</a:t>
+            </a:r>
+            <a:br>
+              <a:rPr lang="es-MX" dirty="0"/>
+            </a:br>
+            <a:r>
+              <a:rPr lang="es-MX" dirty="0"/>
+              <a:t>su ejecución; es decir el espacio de memoria que</a:t>
+            </a:r>
+            <a:br>
+              <a:rPr lang="es-MX" dirty="0"/>
+            </a:br>
+            <a:r>
+              <a:rPr lang="es-MX" dirty="0"/>
+              <a:t>ocupan todas las variables propias del programa. </a:t>
+            </a:r>
+            <a:br>
+              <a:rPr lang="es-MX" dirty="0"/>
+            </a:br>
+            <a:endParaRPr lang="es-MX" dirty="0"/>
+          </a:p>
+          <a:p>
+            <a:r>
+              <a:rPr lang="es-MX" dirty="0"/>
+              <a:t>Para calcular la memoria estática, se suman la cantidad</a:t>
+            </a:r>
+            <a:br>
+              <a:rPr lang="es-MX" dirty="0"/>
+            </a:br>
+            <a:r>
+              <a:rPr lang="es-MX" dirty="0"/>
+              <a:t>de memoria que ocupa cada una de las variables</a:t>
+            </a:r>
+            <a:br>
+              <a:rPr lang="es-MX" dirty="0"/>
+            </a:br>
+            <a:r>
+              <a:rPr lang="es-MX" dirty="0"/>
+              <a:t>declaradas en el programa. </a:t>
+            </a:r>
+            <a:br>
+              <a:rPr lang="es-MX" dirty="0"/>
+            </a:br>
+            <a:endParaRPr lang="es-MX" dirty="0"/>
+          </a:p>
+          <a:p>
+            <a:r>
+              <a:rPr lang="es-MX" dirty="0"/>
+              <a:t>Dicha memoria se divide en </a:t>
+            </a:r>
+            <a:r>
+              <a:rPr lang="es-MX" i="1" dirty="0"/>
+              <a:t>Memoria estática </a:t>
+            </a:r>
+            <a:r>
+              <a:rPr lang="es-MX" dirty="0"/>
+              <a:t>y</a:t>
+            </a:r>
+            <a:br>
+              <a:rPr lang="es-MX" dirty="0"/>
+            </a:br>
+            <a:r>
+              <a:rPr lang="es-MX" i="1" dirty="0"/>
+              <a:t>Memoria dinámica</a:t>
+            </a:r>
+            <a:r>
+              <a:rPr lang="es-MX" dirty="0"/>
+              <a:t> </a:t>
+            </a:r>
+            <a:br>
+              <a:rPr lang="es-MX" dirty="0"/>
+            </a:br>
+            <a:endParaRPr lang="es-MX" dirty="0"/>
+          </a:p>
+        </p:txBody>
+      </p:sp>
+    </p:spTree>
+    <p:extLst>
+      <p:ext uri="{BB962C8B-B14F-4D97-AF65-F5344CB8AC3E}">
+        <p14:creationId xmlns:p14="http://schemas.microsoft.com/office/powerpoint/2010/main" val="3188935454"/>
+      </p:ext>
+    </p:extLst>
+  </p:cSld>
+  <p:clrMapOvr>
+    <a:masterClrMapping/>
+  </p:clrMapOvr>
+</p:sld>
+</file>
+
+<file path=ppt/slides/slide32.xml><?xml version="1.0" encoding="utf-8"?>
+<p:sld xmlns:a="http://schemas.openxmlformats.org/drawingml/2006/main" xmlns:r="http://schemas.openxmlformats.org/officeDocument/2006/relationships" xmlns:p="http://schemas.openxmlformats.org/presentationml/2006/main">
+  <p:cSld>
+    <p:spTree>
+      <p:nvGrpSpPr>
+        <p:cNvPr id="1" name=""/>
+        <p:cNvGrpSpPr/>
+        <p:nvPr/>
+      </p:nvGrpSpPr>
+      <p:grpSpPr>
+        <a:xfrm>
+          <a:off x="0" y="0"/>
+          <a:ext cx="0" cy="0"/>
+          <a:chOff x="0" y="0"/>
+          <a:chExt cx="0" cy="0"/>
+        </a:xfrm>
+      </p:grpSpPr>
+      <p:sp>
+        <p:nvSpPr>
+          <p:cNvPr id="2" name="Título 1">
+            <a:extLst>
+              <a:ext uri="{FF2B5EF4-FFF2-40B4-BE49-F238E27FC236}">
+                <a16:creationId xmlns:a16="http://schemas.microsoft.com/office/drawing/2014/main" id="{7E471566-E2D0-4EEE-B26F-9BFDF1D38ACF}"/>
+              </a:ext>
+            </a:extLst>
+          </p:cNvPr>
+          <p:cNvSpPr>
+            <a:spLocks noGrp="1"/>
+          </p:cNvSpPr>
+          <p:nvPr>
+            <p:ph type="title"/>
+          </p:nvPr>
+        </p:nvSpPr>
+        <p:spPr/>
+        <p:txBody>
+          <a:bodyPr/>
+          <a:lstStyle/>
+          <a:p>
+            <a:r>
+              <a:rPr lang="es-MX" dirty="0"/>
+              <a:t>Complejidad en el espacio</a:t>
+            </a:r>
+          </a:p>
+        </p:txBody>
+      </p:sp>
+      <p:sp>
+        <p:nvSpPr>
+          <p:cNvPr id="3" name="Marcador de contenido 2">
+            <a:extLst>
+              <a:ext uri="{FF2B5EF4-FFF2-40B4-BE49-F238E27FC236}">
+                <a16:creationId xmlns:a16="http://schemas.microsoft.com/office/drawing/2014/main" id="{550962C6-CA0B-42F1-B752-A445893BF371}"/>
+              </a:ext>
+            </a:extLst>
+          </p:cNvPr>
+          <p:cNvSpPr>
+            <a:spLocks noGrp="1"/>
+          </p:cNvSpPr>
+          <p:nvPr>
+            <p:ph idx="1"/>
+          </p:nvPr>
+        </p:nvSpPr>
+        <p:spPr/>
+        <p:txBody>
+          <a:bodyPr/>
+          <a:lstStyle/>
+          <a:p>
+            <a:r>
+              <a:rPr lang="es-MX" dirty="0"/>
+              <a:t>Para calcular la memoria estática, se suman la cantidad de memoria que ocupa cada una de las variables declaradas en el programa. </a:t>
+            </a:r>
+            <a:br>
+              <a:rPr lang="es-MX" dirty="0"/>
+            </a:br>
+            <a:endParaRPr lang="es-MX" dirty="0"/>
+          </a:p>
+          <a:p>
+            <a:r>
+              <a:rPr lang="es-MX" dirty="0"/>
+              <a:t>El cálculo de la memoria dinámica, no es tan simple ya que depende</a:t>
+            </a:r>
+            <a:br>
+              <a:rPr lang="es-MX" dirty="0"/>
+            </a:br>
+            <a:r>
+              <a:rPr lang="es-MX" dirty="0"/>
+              <a:t>de cada ejecución del programa o algoritmo y el tipo de estructuras dinámicas que se estén utilizando. </a:t>
+            </a:r>
+            <a:br>
+              <a:rPr lang="es-MX" dirty="0"/>
+            </a:br>
+            <a:endParaRPr lang="es-MX" dirty="0"/>
+          </a:p>
+        </p:txBody>
+      </p:sp>
+    </p:spTree>
+    <p:extLst>
+      <p:ext uri="{BB962C8B-B14F-4D97-AF65-F5344CB8AC3E}">
+        <p14:creationId xmlns:p14="http://schemas.microsoft.com/office/powerpoint/2010/main" val="2857678501"/>
+      </p:ext>
+    </p:extLst>
+  </p:cSld>
+  <p:clrMapOvr>
+    <a:masterClrMapping/>
+  </p:clrMapOvr>
+</p:sld>
+</file>
+
+<file path=ppt/slides/slide33.xml><?xml version="1.0" encoding="utf-8"?>
+<p:sld xmlns:a="http://schemas.openxmlformats.org/drawingml/2006/main" xmlns:r="http://schemas.openxmlformats.org/officeDocument/2006/relationships" xmlns:p="http://schemas.openxmlformats.org/presentationml/2006/main">
+  <p:cSld>
+    <p:spTree>
+      <p:nvGrpSpPr>
+        <p:cNvPr id="1" name=""/>
+        <p:cNvGrpSpPr/>
+        <p:nvPr/>
+      </p:nvGrpSpPr>
+      <p:grpSpPr>
+        <a:xfrm>
+          <a:off x="0" y="0"/>
+          <a:ext cx="0" cy="0"/>
+          <a:chOff x="0" y="0"/>
+          <a:chExt cx="0" cy="0"/>
+        </a:xfrm>
+      </p:grpSpPr>
+      <p:sp>
+        <p:nvSpPr>
+          <p:cNvPr id="2" name="Título 1">
+            <a:extLst>
+              <a:ext uri="{FF2B5EF4-FFF2-40B4-BE49-F238E27FC236}">
+                <a16:creationId xmlns:a16="http://schemas.microsoft.com/office/drawing/2014/main" id="{AB5C6BB2-4BAA-48AB-B4D4-EAA3ADDA6C6E}"/>
+              </a:ext>
+            </a:extLst>
+          </p:cNvPr>
+          <p:cNvSpPr>
+            <a:spLocks noGrp="1"/>
+          </p:cNvSpPr>
+          <p:nvPr>
+            <p:ph type="title"/>
+          </p:nvPr>
+        </p:nvSpPr>
+        <p:spPr/>
+        <p:txBody>
+          <a:bodyPr/>
+          <a:lstStyle/>
+          <a:p>
+            <a:r>
+              <a:rPr lang="es-MX" dirty="0"/>
+              <a:t>Características de Selección de algoritmos</a:t>
+            </a:r>
+          </a:p>
+        </p:txBody>
+      </p:sp>
+      <p:sp>
+        <p:nvSpPr>
+          <p:cNvPr id="3" name="Marcador de contenido 2">
+            <a:extLst>
+              <a:ext uri="{FF2B5EF4-FFF2-40B4-BE49-F238E27FC236}">
+                <a16:creationId xmlns:a16="http://schemas.microsoft.com/office/drawing/2014/main" id="{179E3273-24A6-485F-B183-C06A2D34C00C}"/>
+              </a:ext>
+            </a:extLst>
+          </p:cNvPr>
+          <p:cNvSpPr>
+            <a:spLocks noGrp="1"/>
+          </p:cNvSpPr>
+          <p:nvPr>
+            <p:ph idx="1"/>
+          </p:nvPr>
+        </p:nvSpPr>
+        <p:spPr/>
+        <p:txBody>
+          <a:bodyPr>
+            <a:normAutofit fontScale="92500" lnSpcReduction="10000"/>
+          </a:bodyPr>
+          <a:lstStyle/>
+          <a:p>
+            <a:r>
+              <a:rPr lang="es-MX" dirty="0"/>
+              <a:t>EL grado de algoritmo : Entre mas información el algoritmo debe ser más robusto.</a:t>
+            </a:r>
+          </a:p>
+          <a:p>
+            <a:r>
+              <a:rPr lang="es-MX" dirty="0"/>
+              <a:t>Cantidad de datos: Una cantidad muy grande puede hacer prohibitivo utilizar un algoritmo que requiera de mucha memoria adicional. </a:t>
+            </a:r>
+          </a:p>
+          <a:p>
+            <a:r>
+              <a:rPr lang="es-MX" dirty="0"/>
+              <a:t>Tipo de datos: Algunos algoritmos sólo funcionan con un tipo específico de datos (enteros, enteros positivos, etc.) y otros son aplicables a cualquier tipo de dato. </a:t>
+            </a:r>
+          </a:p>
+          <a:p>
+            <a:r>
+              <a:rPr lang="es-MX" dirty="0"/>
+              <a:t>Tamaño de registros: Algunos algoritmos realizan múltiples intercambios (burbuja, inserción). Si los registros son de gran tamaño estos intercambios son más lentos. </a:t>
+            </a:r>
+            <a:br>
+              <a:rPr lang="es-MX" dirty="0"/>
+            </a:br>
+            <a:br>
+              <a:rPr lang="es-MX" dirty="0"/>
+            </a:br>
+            <a:br>
+              <a:rPr lang="es-MX" dirty="0"/>
+            </a:br>
+            <a:br>
+              <a:rPr lang="es-MX" dirty="0"/>
+            </a:br>
+            <a:endParaRPr lang="es-MX" dirty="0"/>
+          </a:p>
+          <a:p>
+            <a:endParaRPr lang="es-MX" dirty="0"/>
+          </a:p>
+        </p:txBody>
+      </p:sp>
+    </p:spTree>
+    <p:extLst>
+      <p:ext uri="{BB962C8B-B14F-4D97-AF65-F5344CB8AC3E}">
+        <p14:creationId xmlns:p14="http://schemas.microsoft.com/office/powerpoint/2010/main" val="4288626846"/>
+      </p:ext>
+    </p:extLst>
+  </p:cSld>
+  <p:clrMapOvr>
+    <a:masterClrMapping/>
+  </p:clrMapOvr>
+</p:sld>
+</file>
+
+<file path=ppt/slides/slide34.xml><?xml version="1.0" encoding="utf-8"?>
+<p:sld xmlns:a="http://schemas.openxmlformats.org/drawingml/2006/main" xmlns:r="http://schemas.openxmlformats.org/officeDocument/2006/relationships" xmlns:p="http://schemas.openxmlformats.org/presentationml/2006/main">
+  <p:cSld>
+    <p:spTree>
+      <p:nvGrpSpPr>
+        <p:cNvPr id="1" name=""/>
+        <p:cNvGrpSpPr/>
+        <p:nvPr/>
+      </p:nvGrpSpPr>
+      <p:grpSpPr>
+        <a:xfrm>
+          <a:off x="0" y="0"/>
+          <a:ext cx="0" cy="0"/>
+          <a:chOff x="0" y="0"/>
+          <a:chExt cx="0" cy="0"/>
+        </a:xfrm>
+      </p:grpSpPr>
+      <p:sp>
+        <p:nvSpPr>
+          <p:cNvPr id="2" name="Título 1">
+            <a:extLst>
+              <a:ext uri="{FF2B5EF4-FFF2-40B4-BE49-F238E27FC236}">
+                <a16:creationId xmlns:a16="http://schemas.microsoft.com/office/drawing/2014/main" id="{96F58042-AC01-4EAD-8316-41305FAF676D}"/>
+              </a:ext>
+            </a:extLst>
+          </p:cNvPr>
+          <p:cNvSpPr>
+            <a:spLocks noGrp="1"/>
+          </p:cNvSpPr>
+          <p:nvPr>
+            <p:ph type="title"/>
+          </p:nvPr>
+        </p:nvSpPr>
+        <p:spPr/>
+        <p:txBody>
+          <a:bodyPr/>
+          <a:lstStyle/>
+          <a:p>
+            <a:endParaRPr lang="es-MX"/>
+          </a:p>
+        </p:txBody>
+      </p:sp>
+      <p:sp>
+        <p:nvSpPr>
+          <p:cNvPr id="3" name="Marcador de contenido 2">
+            <a:extLst>
+              <a:ext uri="{FF2B5EF4-FFF2-40B4-BE49-F238E27FC236}">
+                <a16:creationId xmlns:a16="http://schemas.microsoft.com/office/drawing/2014/main" id="{0EA4D1BA-77C7-41A3-80A3-59A26CAD4674}"/>
+              </a:ext>
+            </a:extLst>
+          </p:cNvPr>
+          <p:cNvSpPr>
+            <a:spLocks noGrp="1"/>
+          </p:cNvSpPr>
+          <p:nvPr>
+            <p:ph idx="1"/>
+          </p:nvPr>
+        </p:nvSpPr>
+        <p:spPr/>
+        <p:txBody>
+          <a:bodyPr/>
+          <a:lstStyle/>
+          <a:p>
+            <a:endParaRPr lang="es-MX"/>
+          </a:p>
+        </p:txBody>
+      </p:sp>
+    </p:spTree>
+    <p:extLst>
+      <p:ext uri="{BB962C8B-B14F-4D97-AF65-F5344CB8AC3E}">
+        <p14:creationId xmlns:p14="http://schemas.microsoft.com/office/powerpoint/2010/main" val="2207044329"/>
       </p:ext>
     </p:extLst>
   </p:cSld>

</xml_diff>